<commit_message>
Update Zowe 23PI2 Planning - Introduction and Agenda.pptx
Signed-off-by: Nicholas Kocsis <kocsis@ca.ibm.com>
</commit_message>
<xml_diff>
--- a/Project Management/PI Planning/23PI2 Planning/Zowe 23PI2 Planning - Introduction and Agenda.pptx
+++ b/Project Management/PI Planning/23PI2 Planning/Zowe 23PI2 Planning - Introduction and Agenda.pptx
@@ -7006,7 +7006,7 @@
                 </a:solidFill>
                 <a:ea typeface="Gill Sans"/>
               </a:rPr>
-              <a:t> 23PI1 Planning</a:t>
+              <a:t> 23PI2 Planning</a:t>
             </a:r>
           </a:p>
           <a:p>
@@ -8874,7 +8874,7 @@
                 <a:latin typeface="Arial" panose="020B0604020202020204" pitchFamily="34" charset="0"/>
                 <a:cs typeface="Arial" panose="020B0604020202020204" pitchFamily="34" charset="0"/>
               </a:rPr>
-              <a:t> 23PI1 </a:t>
+              <a:t> 23PI2 </a:t>
             </a:r>
             <a:r>
               <a:rPr lang="en-US" sz="2800" b="0" strike="noStrike" spc="-1" dirty="0">

</xml_diff>